<commit_message>
Minor edits to chair slides
* Remove on-site tips,
* Update description of joint chartering discussion
</commit_message>
<xml_diff>
--- a/interim-01/Slides/chair-slides-bmwg-ippm.pptx
+++ b/interim-01/Slides/chair-slides-bmwg-ippm.pptx
@@ -319,631 +319,6 @@
     <p1510:client id="{EF859C06-2014-4A3D-B5EE-7F03E77ED81E}" v="8" dt="2025-11-18T12:14:55.073"/>
   </p1510:revLst>
 </p1510:revInfo>
-</file>
-
-<file path=ppt/changesInfos/changesInfo1.xml><?xml version="1.0" encoding="utf-8"?>
-<pc:chgInfo xmlns:a="http://schemas.openxmlformats.org/drawingml/2006/main" xmlns:r="http://schemas.openxmlformats.org/officeDocument/2006/relationships" xmlns:ac="http://schemas.microsoft.com/office/drawing/2013/main/command" xmlns:pc="http://schemas.microsoft.com/office/powerpoint/2013/main/command">
-  <pc:docChgLst>
-    <pc:chgData name="Graf Thomas, SCS-INI-NET-VNC-E2E" userId="487bc3e3-9ce7-4cdd-b7b4-8899ea88d289" providerId="ADAL" clId="{EF859C06-2014-4A3D-B5EE-7F03E77ED81E}"/>
-    <pc:docChg chg="custSel delSld modSld">
-      <pc:chgData name="Graf Thomas, SCS-INI-NET-VNC-E2E" userId="487bc3e3-9ce7-4cdd-b7b4-8899ea88d289" providerId="ADAL" clId="{EF859C06-2014-4A3D-B5EE-7F03E77ED81E}" dt="2025-11-18T12:20:18.024" v="50" actId="1076"/>
-      <pc:docMkLst>
-        <pc:docMk/>
-      </pc:docMkLst>
-      <pc:sldChg chg="modSp mod">
-        <pc:chgData name="Graf Thomas, SCS-INI-NET-VNC-E2E" userId="487bc3e3-9ce7-4cdd-b7b4-8899ea88d289" providerId="ADAL" clId="{EF859C06-2014-4A3D-B5EE-7F03E77ED81E}" dt="2025-11-18T12:12:20.107" v="4"/>
-        <pc:sldMkLst>
-          <pc:docMk/>
-          <pc:sldMk cId="0" sldId="256"/>
-        </pc:sldMkLst>
-        <pc:spChg chg="mod">
-          <ac:chgData name="Graf Thomas, SCS-INI-NET-VNC-E2E" userId="487bc3e3-9ce7-4cdd-b7b4-8899ea88d289" providerId="ADAL" clId="{EF859C06-2014-4A3D-B5EE-7F03E77ED81E}" dt="2025-11-18T12:12:20.107" v="4"/>
-          <ac:spMkLst>
-            <pc:docMk/>
-            <pc:sldMk cId="0" sldId="256"/>
-            <ac:spMk id="99" creationId="{00000000-0000-0000-0000-000000000000}"/>
-          </ac:spMkLst>
-        </pc:spChg>
-        <pc:spChg chg="mod">
-          <ac:chgData name="Graf Thomas, SCS-INI-NET-VNC-E2E" userId="487bc3e3-9ce7-4cdd-b7b4-8899ea88d289" providerId="ADAL" clId="{EF859C06-2014-4A3D-B5EE-7F03E77ED81E}" dt="2025-11-18T12:11:37.868" v="1" actId="20577"/>
-          <ac:spMkLst>
-            <pc:docMk/>
-            <pc:sldMk cId="0" sldId="256"/>
-            <ac:spMk id="100" creationId="{00000000-0000-0000-0000-000000000000}"/>
-          </ac:spMkLst>
-        </pc:spChg>
-      </pc:sldChg>
-      <pc:sldChg chg="del">
-        <pc:chgData name="Graf Thomas, SCS-INI-NET-VNC-E2E" userId="487bc3e3-9ce7-4cdd-b7b4-8899ea88d289" providerId="ADAL" clId="{EF859C06-2014-4A3D-B5EE-7F03E77ED81E}" dt="2025-11-18T12:12:33.039" v="5" actId="47"/>
-        <pc:sldMkLst>
-          <pc:docMk/>
-          <pc:sldMk cId="0" sldId="258"/>
-        </pc:sldMkLst>
-      </pc:sldChg>
-      <pc:sldChg chg="modSp">
-        <pc:chgData name="Graf Thomas, SCS-INI-NET-VNC-E2E" userId="487bc3e3-9ce7-4cdd-b7b4-8899ea88d289" providerId="ADAL" clId="{EF859C06-2014-4A3D-B5EE-7F03E77ED81E}" dt="2025-11-18T12:12:38.158" v="6"/>
-        <pc:sldMkLst>
-          <pc:docMk/>
-          <pc:sldMk cId="0" sldId="259"/>
-        </pc:sldMkLst>
-        <pc:spChg chg="mod">
-          <ac:chgData name="Graf Thomas, SCS-INI-NET-VNC-E2E" userId="487bc3e3-9ce7-4cdd-b7b4-8899ea88d289" providerId="ADAL" clId="{EF859C06-2014-4A3D-B5EE-7F03E77ED81E}" dt="2025-11-18T12:12:38.158" v="6"/>
-          <ac:spMkLst>
-            <pc:docMk/>
-            <pc:sldMk cId="0" sldId="259"/>
-            <ac:spMk id="119" creationId="{00000000-0000-0000-0000-000000000000}"/>
-          </ac:spMkLst>
-        </pc:spChg>
-      </pc:sldChg>
-      <pc:sldChg chg="modSp mod">
-        <pc:chgData name="Graf Thomas, SCS-INI-NET-VNC-E2E" userId="487bc3e3-9ce7-4cdd-b7b4-8899ea88d289" providerId="ADAL" clId="{EF859C06-2014-4A3D-B5EE-7F03E77ED81E}" dt="2025-11-18T12:15:11.677" v="34" actId="14100"/>
-        <pc:sldMkLst>
-          <pc:docMk/>
-          <pc:sldMk cId="0" sldId="260"/>
-        </pc:sldMkLst>
-        <pc:spChg chg="mod">
-          <ac:chgData name="Graf Thomas, SCS-INI-NET-VNC-E2E" userId="487bc3e3-9ce7-4cdd-b7b4-8899ea88d289" providerId="ADAL" clId="{EF859C06-2014-4A3D-B5EE-7F03E77ED81E}" dt="2025-11-18T12:14:33.752" v="30" actId="20577"/>
-          <ac:spMkLst>
-            <pc:docMk/>
-            <pc:sldMk cId="0" sldId="260"/>
-            <ac:spMk id="128" creationId="{00000000-0000-0000-0000-000000000000}"/>
-          </ac:spMkLst>
-        </pc:spChg>
-        <pc:spChg chg="mod">
-          <ac:chgData name="Graf Thomas, SCS-INI-NET-VNC-E2E" userId="487bc3e3-9ce7-4cdd-b7b4-8899ea88d289" providerId="ADAL" clId="{EF859C06-2014-4A3D-B5EE-7F03E77ED81E}" dt="2025-11-18T12:15:11.677" v="34" actId="14100"/>
-          <ac:spMkLst>
-            <pc:docMk/>
-            <pc:sldMk cId="0" sldId="260"/>
-            <ac:spMk id="129" creationId="{00000000-0000-0000-0000-000000000000}"/>
-          </ac:spMkLst>
-        </pc:spChg>
-      </pc:sldChg>
-      <pc:sldChg chg="modSp mod">
-        <pc:chgData name="Graf Thomas, SCS-INI-NET-VNC-E2E" userId="487bc3e3-9ce7-4cdd-b7b4-8899ea88d289" providerId="ADAL" clId="{EF859C06-2014-4A3D-B5EE-7F03E77ED81E}" dt="2025-11-18T12:13:31.659" v="9" actId="6549"/>
-        <pc:sldMkLst>
-          <pc:docMk/>
-          <pc:sldMk cId="3471097262" sldId="261"/>
-        </pc:sldMkLst>
-        <pc:spChg chg="mod">
-          <ac:chgData name="Graf Thomas, SCS-INI-NET-VNC-E2E" userId="487bc3e3-9ce7-4cdd-b7b4-8899ea88d289" providerId="ADAL" clId="{EF859C06-2014-4A3D-B5EE-7F03E77ED81E}" dt="2025-11-18T12:13:31.659" v="9" actId="6549"/>
-          <ac:spMkLst>
-            <pc:docMk/>
-            <pc:sldMk cId="3471097262" sldId="261"/>
-            <ac:spMk id="3" creationId="{DA4A6F5D-9442-B583-BAB9-5A102B90EC22}"/>
-          </ac:spMkLst>
-        </pc:spChg>
-      </pc:sldChg>
-      <pc:sldChg chg="del">
-        <pc:chgData name="Graf Thomas, SCS-INI-NET-VNC-E2E" userId="487bc3e3-9ce7-4cdd-b7b4-8899ea88d289" providerId="ADAL" clId="{EF859C06-2014-4A3D-B5EE-7F03E77ED81E}" dt="2025-11-18T12:15:40.502" v="35" actId="47"/>
-        <pc:sldMkLst>
-          <pc:docMk/>
-          <pc:sldMk cId="2332748115" sldId="263"/>
-        </pc:sldMkLst>
-      </pc:sldChg>
-      <pc:sldChg chg="addSp delSp modSp mod">
-        <pc:chgData name="Graf Thomas, SCS-INI-NET-VNC-E2E" userId="487bc3e3-9ce7-4cdd-b7b4-8899ea88d289" providerId="ADAL" clId="{EF859C06-2014-4A3D-B5EE-7F03E77ED81E}" dt="2025-11-18T12:16:12.755" v="44" actId="1076"/>
-        <pc:sldMkLst>
-          <pc:docMk/>
-          <pc:sldMk cId="703495152" sldId="264"/>
-        </pc:sldMkLst>
-        <pc:picChg chg="add del mod">
-          <ac:chgData name="Graf Thomas, SCS-INI-NET-VNC-E2E" userId="487bc3e3-9ce7-4cdd-b7b4-8899ea88d289" providerId="ADAL" clId="{EF859C06-2014-4A3D-B5EE-7F03E77ED81E}" dt="2025-11-18T12:15:54.577" v="40" actId="478"/>
-          <ac:picMkLst>
-            <pc:docMk/>
-            <pc:sldMk cId="703495152" sldId="264"/>
-            <ac:picMk id="5" creationId="{2BA96233-12F5-51E2-04D0-637B4248128F}"/>
-          </ac:picMkLst>
-        </pc:picChg>
-        <pc:picChg chg="add mod">
-          <ac:chgData name="Graf Thomas, SCS-INI-NET-VNC-E2E" userId="487bc3e3-9ce7-4cdd-b7b4-8899ea88d289" providerId="ADAL" clId="{EF859C06-2014-4A3D-B5EE-7F03E77ED81E}" dt="2025-11-18T12:16:12.755" v="44" actId="1076"/>
-          <ac:picMkLst>
-            <pc:docMk/>
-            <pc:sldMk cId="703495152" sldId="264"/>
-            <ac:picMk id="7" creationId="{8249488F-129E-0F6F-19AF-B00E317A45AF}"/>
-          </ac:picMkLst>
-        </pc:picChg>
-        <pc:picChg chg="del">
-          <ac:chgData name="Graf Thomas, SCS-INI-NET-VNC-E2E" userId="487bc3e3-9ce7-4cdd-b7b4-8899ea88d289" providerId="ADAL" clId="{EF859C06-2014-4A3D-B5EE-7F03E77ED81E}" dt="2025-11-18T12:15:45.865" v="36" actId="478"/>
-          <ac:picMkLst>
-            <pc:docMk/>
-            <pc:sldMk cId="703495152" sldId="264"/>
-            <ac:picMk id="8" creationId="{89CAAE8C-AD6B-C359-A366-CE2EAD39C893}"/>
-          </ac:picMkLst>
-        </pc:picChg>
-      </pc:sldChg>
-      <pc:sldChg chg="del">
-        <pc:chgData name="Graf Thomas, SCS-INI-NET-VNC-E2E" userId="487bc3e3-9ce7-4cdd-b7b4-8899ea88d289" providerId="ADAL" clId="{EF859C06-2014-4A3D-B5EE-7F03E77ED81E}" dt="2025-11-18T12:13:38.568" v="10" actId="47"/>
-        <pc:sldMkLst>
-          <pc:docMk/>
-          <pc:sldMk cId="1372742302" sldId="266"/>
-        </pc:sldMkLst>
-      </pc:sldChg>
-      <pc:sldChg chg="del">
-        <pc:chgData name="Graf Thomas, SCS-INI-NET-VNC-E2E" userId="487bc3e3-9ce7-4cdd-b7b4-8899ea88d289" providerId="ADAL" clId="{EF859C06-2014-4A3D-B5EE-7F03E77ED81E}" dt="2025-11-18T12:13:38.568" v="10" actId="47"/>
-        <pc:sldMkLst>
-          <pc:docMk/>
-          <pc:sldMk cId="2128497270" sldId="269"/>
-        </pc:sldMkLst>
-      </pc:sldChg>
-      <pc:sldChg chg="addSp delSp modSp mod">
-        <pc:chgData name="Graf Thomas, SCS-INI-NET-VNC-E2E" userId="487bc3e3-9ce7-4cdd-b7b4-8899ea88d289" providerId="ADAL" clId="{EF859C06-2014-4A3D-B5EE-7F03E77ED81E}" dt="2025-11-18T12:20:18.024" v="50" actId="1076"/>
-        <pc:sldMkLst>
-          <pc:docMk/>
-          <pc:sldMk cId="1859012803" sldId="271"/>
-        </pc:sldMkLst>
-        <pc:picChg chg="del">
-          <ac:chgData name="Graf Thomas, SCS-INI-NET-VNC-E2E" userId="487bc3e3-9ce7-4cdd-b7b4-8899ea88d289" providerId="ADAL" clId="{EF859C06-2014-4A3D-B5EE-7F03E77ED81E}" dt="2025-11-18T12:16:26.116" v="45" actId="478"/>
-          <ac:picMkLst>
-            <pc:docMk/>
-            <pc:sldMk cId="1859012803" sldId="271"/>
-            <ac:picMk id="5" creationId="{45D31BC4-5700-0D94-0AC5-B7C45E3F062E}"/>
-          </ac:picMkLst>
-        </pc:picChg>
-        <pc:picChg chg="add del mod">
-          <ac:chgData name="Graf Thomas, SCS-INI-NET-VNC-E2E" userId="487bc3e3-9ce7-4cdd-b7b4-8899ea88d289" providerId="ADAL" clId="{EF859C06-2014-4A3D-B5EE-7F03E77ED81E}" dt="2025-11-18T12:20:13.977" v="48" actId="478"/>
-          <ac:picMkLst>
-            <pc:docMk/>
-            <pc:sldMk cId="1859012803" sldId="271"/>
-            <ac:picMk id="6" creationId="{B5824FDC-AEAB-12C1-F9B7-E783ADC75D62}"/>
-          </ac:picMkLst>
-        </pc:picChg>
-        <pc:picChg chg="add mod">
-          <ac:chgData name="Graf Thomas, SCS-INI-NET-VNC-E2E" userId="487bc3e3-9ce7-4cdd-b7b4-8899ea88d289" providerId="ADAL" clId="{EF859C06-2014-4A3D-B5EE-7F03E77ED81E}" dt="2025-11-18T12:20:18.024" v="50" actId="1076"/>
-          <ac:picMkLst>
-            <pc:docMk/>
-            <pc:sldMk cId="1859012803" sldId="271"/>
-            <ac:picMk id="8" creationId="{3E80C31F-C4B2-853C-704F-CDF575DEF945}"/>
-          </ac:picMkLst>
-        </pc:picChg>
-      </pc:sldChg>
-    </pc:docChg>
-  </pc:docChgLst>
-  <pc:docChgLst>
-    <pc:chgData name="Graf Thomas, SCS-INI-NET-VNC-E2E" userId="487bc3e3-9ce7-4cdd-b7b4-8899ea88d289" providerId="ADAL" clId="{52F89B06-B397-4BA4-9DB6-8A81C30956C2}"/>
-    <pc:docChg chg="addSld delSld modSld">
-      <pc:chgData name="Graf Thomas, SCS-INI-NET-VNC-E2E" userId="487bc3e3-9ce7-4cdd-b7b4-8899ea88d289" providerId="ADAL" clId="{52F89B06-B397-4BA4-9DB6-8A81C30956C2}" dt="2025-11-04T14:39:54.897" v="2" actId="47"/>
-      <pc:docMkLst>
-        <pc:docMk/>
-      </pc:docMkLst>
-      <pc:sldChg chg="del">
-        <pc:chgData name="Graf Thomas, SCS-INI-NET-VNC-E2E" userId="487bc3e3-9ce7-4cdd-b7b4-8899ea88d289" providerId="ADAL" clId="{52F89B06-B397-4BA4-9DB6-8A81C30956C2}" dt="2025-11-04T14:39:54.897" v="2" actId="47"/>
-        <pc:sldMkLst>
-          <pc:docMk/>
-          <pc:sldMk cId="0" sldId="257"/>
-        </pc:sldMkLst>
-      </pc:sldChg>
-      <pc:sldChg chg="add del">
-        <pc:chgData name="Graf Thomas, SCS-INI-NET-VNC-E2E" userId="487bc3e3-9ce7-4cdd-b7b4-8899ea88d289" providerId="ADAL" clId="{52F89B06-B397-4BA4-9DB6-8A81C30956C2}" dt="2025-11-04T14:39:38.974" v="1"/>
-        <pc:sldMkLst>
-          <pc:docMk/>
-          <pc:sldMk cId="0" sldId="272"/>
-        </pc:sldMkLst>
-      </pc:sldChg>
-    </pc:docChg>
-  </pc:docChgLst>
-  <pc:docChgLst>
-    <pc:chgData name="Marcus Ihlar" userId="3466507a-8f95-47f2-ae1b-ce7d6ca611a4" providerId="ADAL" clId="{AED546ED-D998-4FD7-8756-673BE2DDCF49}"/>
-    <pc:docChg chg="modSld">
-      <pc:chgData name="Marcus Ihlar" userId="3466507a-8f95-47f2-ae1b-ce7d6ca611a4" providerId="ADAL" clId="{AED546ED-D998-4FD7-8756-673BE2DDCF49}" dt="2025-07-16T10:35:22.434" v="10" actId="20577"/>
-      <pc:docMkLst>
-        <pc:docMk/>
-      </pc:docMkLst>
-      <pc:sldChg chg="modSp mod">
-        <pc:chgData name="Marcus Ihlar" userId="3466507a-8f95-47f2-ae1b-ce7d6ca611a4" providerId="ADAL" clId="{AED546ED-D998-4FD7-8756-673BE2DDCF49}" dt="2025-07-16T10:35:22.434" v="10" actId="20577"/>
-        <pc:sldMkLst>
-          <pc:docMk/>
-          <pc:sldMk cId="0" sldId="256"/>
-        </pc:sldMkLst>
-      </pc:sldChg>
-      <pc:sldChg chg="modSp mod">
-        <pc:chgData name="Marcus Ihlar" userId="3466507a-8f95-47f2-ae1b-ce7d6ca611a4" providerId="ADAL" clId="{AED546ED-D998-4FD7-8756-673BE2DDCF49}" dt="2025-07-16T10:18:57.833" v="8" actId="20577"/>
-        <pc:sldMkLst>
-          <pc:docMk/>
-          <pc:sldMk cId="2128497270" sldId="269"/>
-        </pc:sldMkLst>
-      </pc:sldChg>
-    </pc:docChg>
-  </pc:docChgLst>
-  <pc:docChgLst>
-    <pc:chgData name="Graf Thomas, SCS-INI-NET-VNC-E2E" userId="487bc3e3-9ce7-4cdd-b7b4-8899ea88d289" providerId="ADAL" clId="{4403439A-50EC-49D8-B7F6-3D7264685FDE}"/>
-    <pc:docChg chg="undo custSel addSld modSld sldOrd">
-      <pc:chgData name="Graf Thomas, SCS-INI-NET-VNC-E2E" userId="487bc3e3-9ce7-4cdd-b7b4-8899ea88d289" providerId="ADAL" clId="{4403439A-50EC-49D8-B7F6-3D7264685FDE}" dt="2025-07-21T05:25:01.641" v="1423" actId="1076"/>
-      <pc:docMkLst>
-        <pc:docMk/>
-      </pc:docMkLst>
-      <pc:sldChg chg="modSp mod">
-        <pc:chgData name="Graf Thomas, SCS-INI-NET-VNC-E2E" userId="487bc3e3-9ce7-4cdd-b7b4-8899ea88d289" providerId="ADAL" clId="{4403439A-50EC-49D8-B7F6-3D7264685FDE}" dt="2025-07-10T05:43:59.555" v="6" actId="20577"/>
-        <pc:sldMkLst>
-          <pc:docMk/>
-          <pc:sldMk cId="0" sldId="256"/>
-        </pc:sldMkLst>
-      </pc:sldChg>
-      <pc:sldChg chg="ord">
-        <pc:chgData name="Graf Thomas, SCS-INI-NET-VNC-E2E" userId="487bc3e3-9ce7-4cdd-b7b4-8899ea88d289" providerId="ADAL" clId="{4403439A-50EC-49D8-B7F6-3D7264685FDE}" dt="2025-07-10T06:22:20.341" v="686"/>
-        <pc:sldMkLst>
-          <pc:docMk/>
-          <pc:sldMk cId="0" sldId="259"/>
-        </pc:sldMkLst>
-      </pc:sldChg>
-      <pc:sldChg chg="modSp mod">
-        <pc:chgData name="Graf Thomas, SCS-INI-NET-VNC-E2E" userId="487bc3e3-9ce7-4cdd-b7b4-8899ea88d289" providerId="ADAL" clId="{4403439A-50EC-49D8-B7F6-3D7264685FDE}" dt="2025-07-10T05:48:14.572" v="76" actId="20577"/>
-        <pc:sldMkLst>
-          <pc:docMk/>
-          <pc:sldMk cId="0" sldId="260"/>
-        </pc:sldMkLst>
-      </pc:sldChg>
-      <pc:sldChg chg="modSp mod">
-        <pc:chgData name="Graf Thomas, SCS-INI-NET-VNC-E2E" userId="487bc3e3-9ce7-4cdd-b7b4-8899ea88d289" providerId="ADAL" clId="{4403439A-50EC-49D8-B7F6-3D7264685FDE}" dt="2025-07-10T05:44:34.935" v="15" actId="20577"/>
-        <pc:sldMkLst>
-          <pc:docMk/>
-          <pc:sldMk cId="3471097262" sldId="261"/>
-        </pc:sldMkLst>
-      </pc:sldChg>
-      <pc:sldChg chg="addSp delSp modSp mod">
-        <pc:chgData name="Graf Thomas, SCS-INI-NET-VNC-E2E" userId="487bc3e3-9ce7-4cdd-b7b4-8899ea88d289" providerId="ADAL" clId="{4403439A-50EC-49D8-B7F6-3D7264685FDE}" dt="2025-07-21T05:25:01.641" v="1423" actId="1076"/>
-        <pc:sldMkLst>
-          <pc:docMk/>
-          <pc:sldMk cId="2332748115" sldId="263"/>
-        </pc:sldMkLst>
-      </pc:sldChg>
-      <pc:sldChg chg="addSp delSp modSp mod">
-        <pc:chgData name="Graf Thomas, SCS-INI-NET-VNC-E2E" userId="487bc3e3-9ce7-4cdd-b7b4-8899ea88d289" providerId="ADAL" clId="{4403439A-50EC-49D8-B7F6-3D7264685FDE}" dt="2025-07-14T15:38:27.636" v="757" actId="1076"/>
-        <pc:sldMkLst>
-          <pc:docMk/>
-          <pc:sldMk cId="703495152" sldId="264"/>
-        </pc:sldMkLst>
-      </pc:sldChg>
-      <pc:sldChg chg="modSp mod">
-        <pc:chgData name="Graf Thomas, SCS-INI-NET-VNC-E2E" userId="487bc3e3-9ce7-4cdd-b7b4-8899ea88d289" providerId="ADAL" clId="{4403439A-50EC-49D8-B7F6-3D7264685FDE}" dt="2025-07-10T06:06:38.835" v="223" actId="14100"/>
-        <pc:sldMkLst>
-          <pc:docMk/>
-          <pc:sldMk cId="1372742302" sldId="266"/>
-        </pc:sldMkLst>
-      </pc:sldChg>
-      <pc:sldChg chg="modSp add mod">
-        <pc:chgData name="Graf Thomas, SCS-INI-NET-VNC-E2E" userId="487bc3e3-9ce7-4cdd-b7b4-8899ea88d289" providerId="ADAL" clId="{4403439A-50EC-49D8-B7F6-3D7264685FDE}" dt="2025-07-10T06:00:40.529" v="209" actId="20577"/>
-        <pc:sldMkLst>
-          <pc:docMk/>
-          <pc:sldMk cId="1383312952" sldId="267"/>
-        </pc:sldMkLst>
-      </pc:sldChg>
-      <pc:sldChg chg="modSp add mod ord">
-        <pc:chgData name="Graf Thomas, SCS-INI-NET-VNC-E2E" userId="487bc3e3-9ce7-4cdd-b7b4-8899ea88d289" providerId="ADAL" clId="{4403439A-50EC-49D8-B7F6-3D7264685FDE}" dt="2025-07-10T06:00:34.413" v="207" actId="20577"/>
-        <pc:sldMkLst>
-          <pc:docMk/>
-          <pc:sldMk cId="1659843495" sldId="268"/>
-        </pc:sldMkLst>
-      </pc:sldChg>
-      <pc:sldChg chg="modSp add mod">
-        <pc:chgData name="Graf Thomas, SCS-INI-NET-VNC-E2E" userId="487bc3e3-9ce7-4cdd-b7b4-8899ea88d289" providerId="ADAL" clId="{4403439A-50EC-49D8-B7F6-3D7264685FDE}" dt="2025-07-10T06:19:40.757" v="684" actId="20577"/>
-        <pc:sldMkLst>
-          <pc:docMk/>
-          <pc:sldMk cId="2128497270" sldId="269"/>
-        </pc:sldMkLst>
-      </pc:sldChg>
-      <pc:sldChg chg="modSp add mod ord">
-        <pc:chgData name="Graf Thomas, SCS-INI-NET-VNC-E2E" userId="487bc3e3-9ce7-4cdd-b7b4-8899ea88d289" providerId="ADAL" clId="{4403439A-50EC-49D8-B7F6-3D7264685FDE}" dt="2025-07-15T09:01:50.650" v="1407" actId="20577"/>
-        <pc:sldMkLst>
-          <pc:docMk/>
-          <pc:sldMk cId="2434865477" sldId="270"/>
-        </pc:sldMkLst>
-      </pc:sldChg>
-      <pc:sldChg chg="addSp delSp modSp add mod">
-        <pc:chgData name="Graf Thomas, SCS-INI-NET-VNC-E2E" userId="487bc3e3-9ce7-4cdd-b7b4-8899ea88d289" providerId="ADAL" clId="{4403439A-50EC-49D8-B7F6-3D7264685FDE}" dt="2025-07-14T15:38:57.390" v="780" actId="1076"/>
-        <pc:sldMkLst>
-          <pc:docMk/>
-          <pc:sldMk cId="1859012803" sldId="271"/>
-        </pc:sldMkLst>
-      </pc:sldChg>
-    </pc:docChg>
-  </pc:docChgLst>
-  <pc:docChgLst>
-    <pc:chgData name="Graf Thomas, SCS-INI-NET-VNC-E2E" userId="487bc3e3-9ce7-4cdd-b7b4-8899ea88d289" providerId="ADAL" clId="{4725F99E-EFE0-4780-BB38-6BDDFB9F73C4}"/>
-    <pc:docChg chg="undo custSel delSld modSld">
-      <pc:chgData name="Graf Thomas, SCS-INI-NET-VNC-E2E" userId="487bc3e3-9ce7-4cdd-b7b4-8899ea88d289" providerId="ADAL" clId="{4725F99E-EFE0-4780-BB38-6BDDFB9F73C4}" dt="2025-10-27T07:49:36.115" v="1042" actId="20577"/>
-      <pc:docMkLst>
-        <pc:docMk/>
-      </pc:docMkLst>
-      <pc:sldChg chg="modSp mod">
-        <pc:chgData name="Graf Thomas, SCS-INI-NET-VNC-E2E" userId="487bc3e3-9ce7-4cdd-b7b4-8899ea88d289" providerId="ADAL" clId="{4725F99E-EFE0-4780-BB38-6BDDFB9F73C4}" dt="2025-10-27T07:43:43.844" v="1022" actId="790"/>
-        <pc:sldMkLst>
-          <pc:docMk/>
-          <pc:sldMk cId="0" sldId="256"/>
-        </pc:sldMkLst>
-        <pc:spChg chg="mod">
-          <ac:chgData name="Graf Thomas, SCS-INI-NET-VNC-E2E" userId="487bc3e3-9ce7-4cdd-b7b4-8899ea88d289" providerId="ADAL" clId="{4725F99E-EFE0-4780-BB38-6BDDFB9F73C4}" dt="2025-10-27T07:43:43.844" v="1022" actId="790"/>
-          <ac:spMkLst>
-            <pc:docMk/>
-            <pc:sldMk cId="0" sldId="256"/>
-            <ac:spMk id="99" creationId="{00000000-0000-0000-0000-000000000000}"/>
-          </ac:spMkLst>
-        </pc:spChg>
-        <pc:spChg chg="mod">
-          <ac:chgData name="Graf Thomas, SCS-INI-NET-VNC-E2E" userId="487bc3e3-9ce7-4cdd-b7b4-8899ea88d289" providerId="ADAL" clId="{4725F99E-EFE0-4780-BB38-6BDDFB9F73C4}" dt="2025-10-27T07:43:43.844" v="1022" actId="790"/>
-          <ac:spMkLst>
-            <pc:docMk/>
-            <pc:sldMk cId="0" sldId="256"/>
-            <ac:spMk id="100" creationId="{00000000-0000-0000-0000-000000000000}"/>
-          </ac:spMkLst>
-        </pc:spChg>
-        <pc:spChg chg="mod">
-          <ac:chgData name="Graf Thomas, SCS-INI-NET-VNC-E2E" userId="487bc3e3-9ce7-4cdd-b7b4-8899ea88d289" providerId="ADAL" clId="{4725F99E-EFE0-4780-BB38-6BDDFB9F73C4}" dt="2025-10-27T07:43:43.844" v="1022" actId="790"/>
-          <ac:spMkLst>
-            <pc:docMk/>
-            <pc:sldMk cId="0" sldId="256"/>
-            <ac:spMk id="101" creationId="{00000000-0000-0000-0000-000000000000}"/>
-          </ac:spMkLst>
-        </pc:spChg>
-        <pc:spChg chg="mod">
-          <ac:chgData name="Graf Thomas, SCS-INI-NET-VNC-E2E" userId="487bc3e3-9ce7-4cdd-b7b4-8899ea88d289" providerId="ADAL" clId="{4725F99E-EFE0-4780-BB38-6BDDFB9F73C4}" dt="2025-10-27T07:43:43.844" v="1022" actId="790"/>
-          <ac:spMkLst>
-            <pc:docMk/>
-            <pc:sldMk cId="0" sldId="256"/>
-            <ac:spMk id="102" creationId="{00000000-0000-0000-0000-000000000000}"/>
-          </ac:spMkLst>
-        </pc:spChg>
-      </pc:sldChg>
-      <pc:sldChg chg="modSp mod">
-        <pc:chgData name="Graf Thomas, SCS-INI-NET-VNC-E2E" userId="487bc3e3-9ce7-4cdd-b7b4-8899ea88d289" providerId="ADAL" clId="{4725F99E-EFE0-4780-BB38-6BDDFB9F73C4}" dt="2025-10-27T07:43:53.689" v="1023" actId="790"/>
-        <pc:sldMkLst>
-          <pc:docMk/>
-          <pc:sldMk cId="0" sldId="257"/>
-        </pc:sldMkLst>
-      </pc:sldChg>
-      <pc:sldChg chg="modSp mod">
-        <pc:chgData name="Graf Thomas, SCS-INI-NET-VNC-E2E" userId="487bc3e3-9ce7-4cdd-b7b4-8899ea88d289" providerId="ADAL" clId="{4725F99E-EFE0-4780-BB38-6BDDFB9F73C4}" dt="2025-10-27T07:44:00.397" v="1024" actId="790"/>
-        <pc:sldMkLst>
-          <pc:docMk/>
-          <pc:sldMk cId="0" sldId="258"/>
-        </pc:sldMkLst>
-      </pc:sldChg>
-      <pc:sldChg chg="modSp mod">
-        <pc:chgData name="Graf Thomas, SCS-INI-NET-VNC-E2E" userId="487bc3e3-9ce7-4cdd-b7b4-8899ea88d289" providerId="ADAL" clId="{4725F99E-EFE0-4780-BB38-6BDDFB9F73C4}" dt="2025-10-27T07:44:05.500" v="1025" actId="790"/>
-        <pc:sldMkLst>
-          <pc:docMk/>
-          <pc:sldMk cId="0" sldId="259"/>
-        </pc:sldMkLst>
-        <pc:spChg chg="mod">
-          <ac:chgData name="Graf Thomas, SCS-INI-NET-VNC-E2E" userId="487bc3e3-9ce7-4cdd-b7b4-8899ea88d289" providerId="ADAL" clId="{4725F99E-EFE0-4780-BB38-6BDDFB9F73C4}" dt="2025-10-27T07:44:05.500" v="1025" actId="790"/>
-          <ac:spMkLst>
-            <pc:docMk/>
-            <pc:sldMk cId="0" sldId="259"/>
-            <ac:spMk id="119" creationId="{00000000-0000-0000-0000-000000000000}"/>
-          </ac:spMkLst>
-        </pc:spChg>
-        <pc:spChg chg="mod">
-          <ac:chgData name="Graf Thomas, SCS-INI-NET-VNC-E2E" userId="487bc3e3-9ce7-4cdd-b7b4-8899ea88d289" providerId="ADAL" clId="{4725F99E-EFE0-4780-BB38-6BDDFB9F73C4}" dt="2025-10-27T07:44:05.500" v="1025" actId="790"/>
-          <ac:spMkLst>
-            <pc:docMk/>
-            <pc:sldMk cId="0" sldId="259"/>
-            <ac:spMk id="120" creationId="{00000000-0000-0000-0000-000000000000}"/>
-          </ac:spMkLst>
-        </pc:spChg>
-        <pc:spChg chg="mod">
-          <ac:chgData name="Graf Thomas, SCS-INI-NET-VNC-E2E" userId="487bc3e3-9ce7-4cdd-b7b4-8899ea88d289" providerId="ADAL" clId="{4725F99E-EFE0-4780-BB38-6BDDFB9F73C4}" dt="2025-10-27T07:44:05.500" v="1025" actId="790"/>
-          <ac:spMkLst>
-            <pc:docMk/>
-            <pc:sldMk cId="0" sldId="259"/>
-            <ac:spMk id="121" creationId="{00000000-0000-0000-0000-000000000000}"/>
-          </ac:spMkLst>
-        </pc:spChg>
-        <pc:spChg chg="mod">
-          <ac:chgData name="Graf Thomas, SCS-INI-NET-VNC-E2E" userId="487bc3e3-9ce7-4cdd-b7b4-8899ea88d289" providerId="ADAL" clId="{4725F99E-EFE0-4780-BB38-6BDDFB9F73C4}" dt="2025-10-27T07:44:05.500" v="1025" actId="790"/>
-          <ac:spMkLst>
-            <pc:docMk/>
-            <pc:sldMk cId="0" sldId="259"/>
-            <ac:spMk id="122" creationId="{00000000-0000-0000-0000-000000000000}"/>
-          </ac:spMkLst>
-        </pc:spChg>
-      </pc:sldChg>
-      <pc:sldChg chg="modSp mod">
-        <pc:chgData name="Graf Thomas, SCS-INI-NET-VNC-E2E" userId="487bc3e3-9ce7-4cdd-b7b4-8899ea88d289" providerId="ADAL" clId="{4725F99E-EFE0-4780-BB38-6BDDFB9F73C4}" dt="2025-10-27T07:48:29.201" v="1038" actId="14100"/>
-        <pc:sldMkLst>
-          <pc:docMk/>
-          <pc:sldMk cId="0" sldId="260"/>
-        </pc:sldMkLst>
-        <pc:spChg chg="mod">
-          <ac:chgData name="Graf Thomas, SCS-INI-NET-VNC-E2E" userId="487bc3e3-9ce7-4cdd-b7b4-8899ea88d289" providerId="ADAL" clId="{4725F99E-EFE0-4780-BB38-6BDDFB9F73C4}" dt="2025-10-27T07:29:40.824" v="870" actId="20577"/>
-          <ac:spMkLst>
-            <pc:docMk/>
-            <pc:sldMk cId="0" sldId="260"/>
-            <ac:spMk id="128" creationId="{00000000-0000-0000-0000-000000000000}"/>
-          </ac:spMkLst>
-        </pc:spChg>
-        <pc:spChg chg="mod">
-          <ac:chgData name="Graf Thomas, SCS-INI-NET-VNC-E2E" userId="487bc3e3-9ce7-4cdd-b7b4-8899ea88d289" providerId="ADAL" clId="{4725F99E-EFE0-4780-BB38-6BDDFB9F73C4}" dt="2025-10-27T07:48:29.201" v="1038" actId="14100"/>
-          <ac:spMkLst>
-            <pc:docMk/>
-            <pc:sldMk cId="0" sldId="260"/>
-            <ac:spMk id="130" creationId="{00000000-0000-0000-0000-000000000000}"/>
-          </ac:spMkLst>
-        </pc:spChg>
-      </pc:sldChg>
-      <pc:sldChg chg="modSp mod">
-        <pc:chgData name="Graf Thomas, SCS-INI-NET-VNC-E2E" userId="487bc3e3-9ce7-4cdd-b7b4-8899ea88d289" providerId="ADAL" clId="{4725F99E-EFE0-4780-BB38-6BDDFB9F73C4}" dt="2025-10-27T07:44:34.772" v="1029" actId="790"/>
-        <pc:sldMkLst>
-          <pc:docMk/>
-          <pc:sldMk cId="3471097262" sldId="261"/>
-        </pc:sldMkLst>
-        <pc:spChg chg="mod">
-          <ac:chgData name="Graf Thomas, SCS-INI-NET-VNC-E2E" userId="487bc3e3-9ce7-4cdd-b7b4-8899ea88d289" providerId="ADAL" clId="{4725F99E-EFE0-4780-BB38-6BDDFB9F73C4}" dt="2025-10-27T07:44:34.772" v="1029" actId="790"/>
-          <ac:spMkLst>
-            <pc:docMk/>
-            <pc:sldMk cId="3471097262" sldId="261"/>
-            <ac:spMk id="2" creationId="{0B9E15DC-F076-98D2-1BDF-BC01FEC9047B}"/>
-          </ac:spMkLst>
-        </pc:spChg>
-        <pc:spChg chg="mod">
-          <ac:chgData name="Graf Thomas, SCS-INI-NET-VNC-E2E" userId="487bc3e3-9ce7-4cdd-b7b4-8899ea88d289" providerId="ADAL" clId="{4725F99E-EFE0-4780-BB38-6BDDFB9F73C4}" dt="2025-10-27T07:44:34.772" v="1029" actId="790"/>
-          <ac:spMkLst>
-            <pc:docMk/>
-            <pc:sldMk cId="3471097262" sldId="261"/>
-            <ac:spMk id="3" creationId="{DA4A6F5D-9442-B583-BAB9-5A102B90EC22}"/>
-          </ac:spMkLst>
-        </pc:spChg>
-        <pc:spChg chg="mod">
-          <ac:chgData name="Graf Thomas, SCS-INI-NET-VNC-E2E" userId="487bc3e3-9ce7-4cdd-b7b4-8899ea88d289" providerId="ADAL" clId="{4725F99E-EFE0-4780-BB38-6BDDFB9F73C4}" dt="2025-10-27T07:44:34.772" v="1029" actId="790"/>
-          <ac:spMkLst>
-            <pc:docMk/>
-            <pc:sldMk cId="3471097262" sldId="261"/>
-            <ac:spMk id="4" creationId="{D216BDC7-4DE9-D9D5-0725-BBEF6CFE8DF1}"/>
-          </ac:spMkLst>
-        </pc:spChg>
-      </pc:sldChg>
-      <pc:sldChg chg="addSp delSp modSp mod">
-        <pc:chgData name="Graf Thomas, SCS-INI-NET-VNC-E2E" userId="487bc3e3-9ce7-4cdd-b7b4-8899ea88d289" providerId="ADAL" clId="{4725F99E-EFE0-4780-BB38-6BDDFB9F73C4}" dt="2025-10-27T07:44:42.065" v="1030" actId="790"/>
-        <pc:sldMkLst>
-          <pc:docMk/>
-          <pc:sldMk cId="2332748115" sldId="263"/>
-        </pc:sldMkLst>
-      </pc:sldChg>
-      <pc:sldChg chg="addSp delSp modSp mod">
-        <pc:chgData name="Graf Thomas, SCS-INI-NET-VNC-E2E" userId="487bc3e3-9ce7-4cdd-b7b4-8899ea88d289" providerId="ADAL" clId="{4725F99E-EFE0-4780-BB38-6BDDFB9F73C4}" dt="2025-10-27T07:48:38.632" v="1041" actId="14100"/>
-        <pc:sldMkLst>
-          <pc:docMk/>
-          <pc:sldMk cId="703495152" sldId="264"/>
-        </pc:sldMkLst>
-        <pc:spChg chg="mod">
-          <ac:chgData name="Graf Thomas, SCS-INI-NET-VNC-E2E" userId="487bc3e3-9ce7-4cdd-b7b4-8899ea88d289" providerId="ADAL" clId="{4725F99E-EFE0-4780-BB38-6BDDFB9F73C4}" dt="2025-10-27T07:44:47.943" v="1031" actId="790"/>
-          <ac:spMkLst>
-            <pc:docMk/>
-            <pc:sldMk cId="703495152" sldId="264"/>
-            <ac:spMk id="2" creationId="{0B9E15DC-F076-98D2-1BDF-BC01FEC9047B}"/>
-          </ac:spMkLst>
-        </pc:spChg>
-        <pc:spChg chg="mod">
-          <ac:chgData name="Graf Thomas, SCS-INI-NET-VNC-E2E" userId="487bc3e3-9ce7-4cdd-b7b4-8899ea88d289" providerId="ADAL" clId="{4725F99E-EFE0-4780-BB38-6BDDFB9F73C4}" dt="2025-10-27T07:48:38.632" v="1041" actId="14100"/>
-          <ac:spMkLst>
-            <pc:docMk/>
-            <pc:sldMk cId="703495152" sldId="264"/>
-            <ac:spMk id="4" creationId="{D216BDC7-4DE9-D9D5-0725-BBEF6CFE8DF1}"/>
-          </ac:spMkLst>
-        </pc:spChg>
-      </pc:sldChg>
-      <pc:sldChg chg="modSp mod">
-        <pc:chgData name="Graf Thomas, SCS-INI-NET-VNC-E2E" userId="487bc3e3-9ce7-4cdd-b7b4-8899ea88d289" providerId="ADAL" clId="{4725F99E-EFE0-4780-BB38-6BDDFB9F73C4}" dt="2025-10-27T07:48:32.985" v="1039" actId="14100"/>
-        <pc:sldMkLst>
-          <pc:docMk/>
-          <pc:sldMk cId="1372742302" sldId="266"/>
-        </pc:sldMkLst>
-      </pc:sldChg>
-      <pc:sldChg chg="modSp mod">
-        <pc:chgData name="Graf Thomas, SCS-INI-NET-VNC-E2E" userId="487bc3e3-9ce7-4cdd-b7b4-8899ea88d289" providerId="ADAL" clId="{4725F99E-EFE0-4780-BB38-6BDDFB9F73C4}" dt="2025-10-27T07:44:28.099" v="1028" actId="790"/>
-        <pc:sldMkLst>
-          <pc:docMk/>
-          <pc:sldMk cId="1383312952" sldId="267"/>
-        </pc:sldMkLst>
-        <pc:spChg chg="mod">
-          <ac:chgData name="Graf Thomas, SCS-INI-NET-VNC-E2E" userId="487bc3e3-9ce7-4cdd-b7b4-8899ea88d289" providerId="ADAL" clId="{4725F99E-EFE0-4780-BB38-6BDDFB9F73C4}" dt="2025-10-27T07:44:28.099" v="1028" actId="790"/>
-          <ac:spMkLst>
-            <pc:docMk/>
-            <pc:sldMk cId="1383312952" sldId="267"/>
-            <ac:spMk id="113" creationId="{00000000-0000-0000-0000-000000000000}"/>
-          </ac:spMkLst>
-        </pc:spChg>
-        <pc:spChg chg="mod">
-          <ac:chgData name="Graf Thomas, SCS-INI-NET-VNC-E2E" userId="487bc3e3-9ce7-4cdd-b7b4-8899ea88d289" providerId="ADAL" clId="{4725F99E-EFE0-4780-BB38-6BDDFB9F73C4}" dt="2025-10-27T07:44:28.099" v="1028" actId="790"/>
-          <ac:spMkLst>
-            <pc:docMk/>
-            <pc:sldMk cId="1383312952" sldId="267"/>
-            <ac:spMk id="114" creationId="{00000000-0000-0000-0000-000000000000}"/>
-          </ac:spMkLst>
-        </pc:spChg>
-      </pc:sldChg>
-      <pc:sldChg chg="modSp mod">
-        <pc:chgData name="Graf Thomas, SCS-INI-NET-VNC-E2E" userId="487bc3e3-9ce7-4cdd-b7b4-8899ea88d289" providerId="ADAL" clId="{4725F99E-EFE0-4780-BB38-6BDDFB9F73C4}" dt="2025-10-27T07:44:19.944" v="1027" actId="790"/>
-        <pc:sldMkLst>
-          <pc:docMk/>
-          <pc:sldMk cId="1659843495" sldId="268"/>
-        </pc:sldMkLst>
-        <pc:spChg chg="mod">
-          <ac:chgData name="Graf Thomas, SCS-INI-NET-VNC-E2E" userId="487bc3e3-9ce7-4cdd-b7b4-8899ea88d289" providerId="ADAL" clId="{4725F99E-EFE0-4780-BB38-6BDDFB9F73C4}" dt="2025-10-27T07:44:19.944" v="1027" actId="790"/>
-          <ac:spMkLst>
-            <pc:docMk/>
-            <pc:sldMk cId="1659843495" sldId="268"/>
-            <ac:spMk id="113" creationId="{00000000-0000-0000-0000-000000000000}"/>
-          </ac:spMkLst>
-        </pc:spChg>
-        <pc:spChg chg="mod">
-          <ac:chgData name="Graf Thomas, SCS-INI-NET-VNC-E2E" userId="487bc3e3-9ce7-4cdd-b7b4-8899ea88d289" providerId="ADAL" clId="{4725F99E-EFE0-4780-BB38-6BDDFB9F73C4}" dt="2025-10-27T07:44:19.944" v="1027" actId="790"/>
-          <ac:spMkLst>
-            <pc:docMk/>
-            <pc:sldMk cId="1659843495" sldId="268"/>
-            <ac:spMk id="114" creationId="{00000000-0000-0000-0000-000000000000}"/>
-          </ac:spMkLst>
-        </pc:spChg>
-      </pc:sldChg>
-      <pc:sldChg chg="modSp mod">
-        <pc:chgData name="Graf Thomas, SCS-INI-NET-VNC-E2E" userId="487bc3e3-9ce7-4cdd-b7b4-8899ea88d289" providerId="ADAL" clId="{4725F99E-EFE0-4780-BB38-6BDDFB9F73C4}" dt="2025-10-27T07:48:26.232" v="1037" actId="14100"/>
-        <pc:sldMkLst>
-          <pc:docMk/>
-          <pc:sldMk cId="2128497270" sldId="269"/>
-        </pc:sldMkLst>
-      </pc:sldChg>
-      <pc:sldChg chg="modSp mod">
-        <pc:chgData name="Graf Thomas, SCS-INI-NET-VNC-E2E" userId="487bc3e3-9ce7-4cdd-b7b4-8899ea88d289" providerId="ADAL" clId="{4725F99E-EFE0-4780-BB38-6BDDFB9F73C4}" dt="2025-10-27T07:49:36.115" v="1042" actId="20577"/>
-        <pc:sldMkLst>
-          <pc:docMk/>
-          <pc:sldMk cId="2434865477" sldId="270"/>
-        </pc:sldMkLst>
-        <pc:spChg chg="mod">
-          <ac:chgData name="Graf Thomas, SCS-INI-NET-VNC-E2E" userId="487bc3e3-9ce7-4cdd-b7b4-8899ea88d289" providerId="ADAL" clId="{4725F99E-EFE0-4780-BB38-6BDDFB9F73C4}" dt="2025-10-27T07:44:12.337" v="1026" actId="790"/>
-          <ac:spMkLst>
-            <pc:docMk/>
-            <pc:sldMk cId="2434865477" sldId="270"/>
-            <ac:spMk id="2" creationId="{0B9E15DC-F076-98D2-1BDF-BC01FEC9047B}"/>
-          </ac:spMkLst>
-        </pc:spChg>
-        <pc:spChg chg="mod">
-          <ac:chgData name="Graf Thomas, SCS-INI-NET-VNC-E2E" userId="487bc3e3-9ce7-4cdd-b7b4-8899ea88d289" providerId="ADAL" clId="{4725F99E-EFE0-4780-BB38-6BDDFB9F73C4}" dt="2025-10-27T07:49:36.115" v="1042" actId="20577"/>
-          <ac:spMkLst>
-            <pc:docMk/>
-            <pc:sldMk cId="2434865477" sldId="270"/>
-            <ac:spMk id="3" creationId="{DA4A6F5D-9442-B583-BAB9-5A102B90EC22}"/>
-          </ac:spMkLst>
-        </pc:spChg>
-        <pc:spChg chg="mod">
-          <ac:chgData name="Graf Thomas, SCS-INI-NET-VNC-E2E" userId="487bc3e3-9ce7-4cdd-b7b4-8899ea88d289" providerId="ADAL" clId="{4725F99E-EFE0-4780-BB38-6BDDFB9F73C4}" dt="2025-10-27T07:44:12.337" v="1026" actId="790"/>
-          <ac:spMkLst>
-            <pc:docMk/>
-            <pc:sldMk cId="2434865477" sldId="270"/>
-            <ac:spMk id="4" creationId="{D216BDC7-4DE9-D9D5-0725-BBEF6CFE8DF1}"/>
-          </ac:spMkLst>
-        </pc:spChg>
-      </pc:sldChg>
-      <pc:sldChg chg="addSp delSp modSp mod">
-        <pc:chgData name="Graf Thomas, SCS-INI-NET-VNC-E2E" userId="487bc3e3-9ce7-4cdd-b7b4-8899ea88d289" providerId="ADAL" clId="{4725F99E-EFE0-4780-BB38-6BDDFB9F73C4}" dt="2025-10-27T07:48:35.751" v="1040" actId="14100"/>
-        <pc:sldMkLst>
-          <pc:docMk/>
-          <pc:sldMk cId="1859012803" sldId="271"/>
-        </pc:sldMkLst>
-        <pc:spChg chg="mod">
-          <ac:chgData name="Graf Thomas, SCS-INI-NET-VNC-E2E" userId="487bc3e3-9ce7-4cdd-b7b4-8899ea88d289" providerId="ADAL" clId="{4725F99E-EFE0-4780-BB38-6BDDFB9F73C4}" dt="2025-10-27T07:38:34.436" v="1021" actId="20577"/>
-          <ac:spMkLst>
-            <pc:docMk/>
-            <pc:sldMk cId="1859012803" sldId="271"/>
-            <ac:spMk id="2" creationId="{0B9E15DC-F076-98D2-1BDF-BC01FEC9047B}"/>
-          </ac:spMkLst>
-        </pc:spChg>
-        <pc:spChg chg="mod">
-          <ac:chgData name="Graf Thomas, SCS-INI-NET-VNC-E2E" userId="487bc3e3-9ce7-4cdd-b7b4-8899ea88d289" providerId="ADAL" clId="{4725F99E-EFE0-4780-BB38-6BDDFB9F73C4}" dt="2025-10-27T07:48:35.751" v="1040" actId="14100"/>
-          <ac:spMkLst>
-            <pc:docMk/>
-            <pc:sldMk cId="1859012803" sldId="271"/>
-            <ac:spMk id="4" creationId="{D216BDC7-4DE9-D9D5-0725-BBEF6CFE8DF1}"/>
-          </ac:spMkLst>
-        </pc:spChg>
-      </pc:sldChg>
-      <pc:sldChg chg="del">
-        <pc:chgData name="Graf Thomas, SCS-INI-NET-VNC-E2E" userId="487bc3e3-9ce7-4cdd-b7b4-8899ea88d289" providerId="ADAL" clId="{4725F99E-EFE0-4780-BB38-6BDDFB9F73C4}" dt="2025-10-27T07:29:31.409" v="861" actId="2696"/>
-        <pc:sldMkLst>
-          <pc:docMk/>
-          <pc:sldMk cId="333926329" sldId="272"/>
-        </pc:sldMkLst>
-      </pc:sldChg>
-    </pc:docChg>
-  </pc:docChgLst>
-</pc:chgInfo>
 </file>
 
 <file path=ppt/notesMasters/notesMaster1.xml><?xml version="1.0" encoding="utf-8"?>
@@ -30583,7 +29958,7 @@
         <p:fade/>
       </p:transition>
     </mc:Choice>
-    <mc:Fallback xmlns="" xmlns:mv="urn:schemas-microsoft-com:mac:vml" xmlns:c="http://schemas.openxmlformats.org/drawingml/2006/chart" xmlns:dgm="http://schemas.openxmlformats.org/drawingml/2006/diagram" xmlns:o="urn:schemas-microsoft-com:office:office" xmlns:v="urn:schemas-microsoft-com:vml" xmlns:pvml="urn:schemas-microsoft-com:office:powerpoint" xmlns:com="http://schemas.openxmlformats.org/drawingml/2006/compatibility" xmlns:p15="http://schemas.microsoft.com/office/powerpoint/2012/main" xmlns:ahyp="http://schemas.microsoft.com/office/drawing/2018/hyperlinkcolor">
+    <mc:Fallback xmlns:ahyp="http://schemas.microsoft.com/office/drawing/2018/hyperlinkcolor" xmlns:p15="http://schemas.microsoft.com/office/powerpoint/2012/main" xmlns:com="http://schemas.openxmlformats.org/drawingml/2006/compatibility" xmlns:pvml="urn:schemas-microsoft-com:office:powerpoint" xmlns:v="urn:schemas-microsoft-com:vml" xmlns:o="urn:schemas-microsoft-com:office:office" xmlns:dgm="http://schemas.openxmlformats.org/drawingml/2006/diagram" xmlns:c="http://schemas.openxmlformats.org/drawingml/2006/chart" xmlns:mv="urn:schemas-microsoft-com:mac:vml" xmlns="">
       <p:transition spd="slow">
         <p:fade/>
       </p:transition>
@@ -30698,216 +30073,6 @@
                   <a:srgbClr val="000000"/>
                 </a:solidFill>
               </a:rPr>
-              <a:t>In-person participants</a:t>
-            </a:r>
-            <a:endParaRPr lang="en-US" sz="1600" dirty="0">
-              <a:solidFill>
-                <a:srgbClr val="000000"/>
-              </a:solidFill>
-            </a:endParaRPr>
-          </a:p>
-          <a:p>
-            <a:pPr marL="457200" lvl="0" indent="-330200" algn="l" rtl="0">
-              <a:lnSpc>
-                <a:spcPct val="110000"/>
-              </a:lnSpc>
-              <a:spcBef>
-                <a:spcPts val="300"/>
-              </a:spcBef>
-              <a:spcAft>
-                <a:spcPts val="0"/>
-              </a:spcAft>
-              <a:buClr>
-                <a:srgbClr val="000000"/>
-              </a:buClr>
-              <a:buSzPts val="1600"/>
-              <a:buChar char="●"/>
-            </a:pPr>
-            <a:r>
-              <a:rPr lang="en-US" sz="1600" dirty="0">
-                <a:solidFill>
-                  <a:srgbClr val="000000"/>
-                </a:solidFill>
-              </a:rPr>
-              <a:t>Make sure to sign into the session via </a:t>
-            </a:r>
-            <a:r>
-              <a:rPr lang="en-US" sz="1600" dirty="0" err="1">
-                <a:solidFill>
-                  <a:srgbClr val="000000"/>
-                </a:solidFill>
-              </a:rPr>
-              <a:t>Datatracker</a:t>
-            </a:r>
-            <a:r>
-              <a:rPr lang="en-US" sz="1600" dirty="0">
-                <a:solidFill>
-                  <a:srgbClr val="000000"/>
-                </a:solidFill>
-              </a:rPr>
-              <a:t> or the QR Code in this session.</a:t>
-            </a:r>
-          </a:p>
-          <a:p>
-            <a:pPr marL="457200" lvl="0" indent="-330200" algn="l" rtl="0">
-              <a:lnSpc>
-                <a:spcPct val="110000"/>
-              </a:lnSpc>
-              <a:spcBef>
-                <a:spcPts val="0"/>
-              </a:spcBef>
-              <a:spcAft>
-                <a:spcPts val="0"/>
-              </a:spcAft>
-              <a:buClr>
-                <a:srgbClr val="000000"/>
-              </a:buClr>
-              <a:buSzPts val="1600"/>
-              <a:buChar char="●"/>
-            </a:pPr>
-            <a:r>
-              <a:rPr lang="en-US" sz="1600" dirty="0">
-                <a:solidFill>
-                  <a:srgbClr val="000000"/>
-                </a:solidFill>
-              </a:rPr>
-              <a:t>Use </a:t>
-            </a:r>
-            <a:r>
-              <a:rPr lang="en-US" sz="1600" dirty="0" err="1">
-                <a:solidFill>
-                  <a:srgbClr val="000000"/>
-                </a:solidFill>
-              </a:rPr>
-              <a:t>Meetecho</a:t>
-            </a:r>
-            <a:r>
-              <a:rPr lang="en-US" sz="1600" dirty="0">
-                <a:solidFill>
-                  <a:srgbClr val="000000"/>
-                </a:solidFill>
-              </a:rPr>
-              <a:t> (usually the “</a:t>
-            </a:r>
-            <a:r>
-              <a:rPr lang="en-US" sz="1600" dirty="0" err="1">
-                <a:solidFill>
-                  <a:srgbClr val="000000"/>
-                </a:solidFill>
-              </a:rPr>
-              <a:t>Meetecho</a:t>
-            </a:r>
-            <a:r>
-              <a:rPr lang="en-US" sz="1600" dirty="0">
-                <a:solidFill>
-                  <a:srgbClr val="000000"/>
-                </a:solidFill>
-              </a:rPr>
-              <a:t> lite”) client to:</a:t>
-            </a:r>
-          </a:p>
-          <a:p>
-            <a:pPr marL="914400" lvl="1" indent="-330200" algn="l" rtl="0">
-              <a:lnSpc>
-                <a:spcPct val="110000"/>
-              </a:lnSpc>
-              <a:spcBef>
-                <a:spcPts val="0"/>
-              </a:spcBef>
-              <a:spcAft>
-                <a:spcPts val="0"/>
-              </a:spcAft>
-              <a:buClr>
-                <a:srgbClr val="000000"/>
-              </a:buClr>
-              <a:buSzPts val="1600"/>
-              <a:buChar char="○"/>
-            </a:pPr>
-            <a:r>
-              <a:rPr lang="en-US" sz="1600" dirty="0">
-                <a:solidFill>
-                  <a:srgbClr val="000000"/>
-                </a:solidFill>
-              </a:rPr>
-              <a:t>join the mic queue</a:t>
-            </a:r>
-          </a:p>
-          <a:p>
-            <a:pPr marL="914400" lvl="1" indent="-330200" algn="l" rtl="0">
-              <a:lnSpc>
-                <a:spcPct val="110000"/>
-              </a:lnSpc>
-              <a:spcBef>
-                <a:spcPts val="0"/>
-              </a:spcBef>
-              <a:spcAft>
-                <a:spcPts val="0"/>
-              </a:spcAft>
-              <a:buClr>
-                <a:srgbClr val="000000"/>
-              </a:buClr>
-              <a:buSzPts val="1600"/>
-              <a:buChar char="○"/>
-            </a:pPr>
-            <a:r>
-              <a:rPr lang="en-US" sz="1600" dirty="0">
-                <a:solidFill>
-                  <a:srgbClr val="000000"/>
-                </a:solidFill>
-              </a:rPr>
-              <a:t>participate in shows of hands</a:t>
-            </a:r>
-          </a:p>
-          <a:p>
-            <a:pPr marL="457200" lvl="0" indent="-330200" algn="l" rtl="0">
-              <a:lnSpc>
-                <a:spcPct val="110000"/>
-              </a:lnSpc>
-              <a:spcBef>
-                <a:spcPts val="0"/>
-              </a:spcBef>
-              <a:spcAft>
-                <a:spcPts val="0"/>
-              </a:spcAft>
-              <a:buClr>
-                <a:srgbClr val="000000"/>
-              </a:buClr>
-              <a:buSzPts val="1600"/>
-              <a:buChar char="●"/>
-            </a:pPr>
-            <a:r>
-              <a:rPr lang="en-US" sz="1600" i="1" dirty="0">
-                <a:solidFill>
-                  <a:srgbClr val="000000"/>
-                </a:solidFill>
-              </a:rPr>
-              <a:t>Keep audio and video off if not using the onsite version.</a:t>
-            </a:r>
-            <a:endParaRPr lang="en-US" sz="1600" b="1" dirty="0">
-              <a:solidFill>
-                <a:srgbClr val="000000"/>
-              </a:solidFill>
-            </a:endParaRPr>
-          </a:p>
-          <a:p>
-            <a:pPr marL="0" lvl="0" indent="0" algn="l" rtl="0">
-              <a:lnSpc>
-                <a:spcPct val="110000"/>
-              </a:lnSpc>
-              <a:spcBef>
-                <a:spcPts val="300"/>
-              </a:spcBef>
-              <a:spcAft>
-                <a:spcPts val="0"/>
-              </a:spcAft>
-              <a:buNone/>
-            </a:pPr>
-            <a:r>
-              <a:rPr lang="en-US" sz="1600" b="1" dirty="0">
-                <a:solidFill>
-                  <a:srgbClr val="000000"/>
-                </a:solidFill>
-              </a:rPr>
               <a:t>Remote participants </a:t>
             </a:r>
             <a:endParaRPr lang="en-US" sz="1600" dirty="0">
@@ -31073,41 +30238,6 @@
           </a:p>
         </p:txBody>
       </p:sp>
-      <p:pic>
-        <p:nvPicPr>
-          <p:cNvPr id="123" name="Google Shape;123;p22"/>
-          <p:cNvPicPr preferRelativeResize="0"/>
-          <p:nvPr/>
-        </p:nvPicPr>
-        <p:blipFill>
-          <a:blip r:embed="rId3">
-            <a:alphaModFix/>
-          </a:blip>
-          <a:stretch>
-            <a:fillRect/>
-          </a:stretch>
-        </p:blipFill>
-        <p:spPr>
-          <a:xfrm>
-            <a:off x="6916950" y="2699300"/>
-            <a:ext cx="1818475" cy="810300"/>
-          </a:xfrm>
-          <a:prstGeom prst="rect">
-            <a:avLst/>
-          </a:prstGeom>
-          <a:noFill/>
-          <a:ln>
-            <a:noFill/>
-          </a:ln>
-          <a:effectLst>
-            <a:outerShdw blurRad="114300" dist="19050" dir="3000000" algn="bl" rotWithShape="0">
-              <a:srgbClr val="000000">
-                <a:alpha val="50000"/>
-              </a:srgbClr>
-            </a:outerShdw>
-          </a:effectLst>
-        </p:spPr>
-      </p:pic>
     </p:spTree>
   </p:cSld>
   <p:clrMapOvr>
@@ -31184,27 +30314,34 @@
           <a:p>
             <a:r>
               <a:rPr lang="en-US" sz="1500" dirty="0"/>
-              <a:t>Due to similar topics we wanted to facilitate the exchange and discussions between both working groups by having a joint session again and start exploring a joint charter with Qin Wu together. Many thanks Qin for supporting us here.</a:t>
+              <a:t>Due to similar topics we wanted to facilitate the exchange and discussions between both working groups by having a joint session again and start exploring a joint charter with Qin Wu</a:t>
+            </a:r>
+            <a:r>
+              <a:rPr lang="en-001" sz="1500" dirty="0"/>
+              <a:t>.</a:t>
             </a:r>
           </a:p>
           <a:p>
-            <a:pPr>
-              <a:spcBef>
-                <a:spcPts val="1200"/>
-              </a:spcBef>
-            </a:pPr>
+            <a:endParaRPr lang="en-001" sz="1500" dirty="0"/>
+          </a:p>
+          <a:p>
             <a:r>
               <a:rPr lang="en-US" sz="1500" dirty="0"/>
-              <a:t>Qin will be presenting at the end of this session an overview about the current state of both working groups and </a:t>
+              <a:t>Qin </a:t>
             </a:r>
             <a:r>
-              <a:rPr lang="en-US" sz="1500"/>
-              <a:t>the benefits </a:t>
+              <a:rPr lang="en-001" sz="1500" dirty="0"/>
+              <a:t>presented the rationale for joint chartering at IETF 124</a:t>
             </a:r>
             <a:r>
               <a:rPr lang="en-US" sz="1500" dirty="0"/>
-              <a:t>of a joint charter.</a:t>
+              <a:t>.</a:t>
             </a:r>
+            <a:r>
+              <a:rPr lang="en-001" sz="1500" dirty="0"/>
+              <a:t> Since then we have collected feedback from participants of both working groups.</a:t>
+            </a:r>
+            <a:endParaRPr lang="en-US" sz="1500" dirty="0"/>
           </a:p>
           <a:p>
             <a:pPr>
@@ -31213,9 +30350,10 @@
               </a:spcBef>
             </a:pPr>
             <a:r>
-              <a:rPr lang="en-US" sz="1500" dirty="0"/>
-              <a:t>We are looking forward to as much feedback from both working groups during Qin's presentation, on the mailing list and at the next interim meeting on November 20th where we allocated another 30 minutes for joint chartering discussions.</a:t>
+              <a:rPr lang="en-001" sz="1500" dirty="0"/>
+              <a:t>At the end of this meeting Qin will present the current status of the ongoing discussions.</a:t>
             </a:r>
+            <a:endParaRPr lang="en-US" sz="1500" dirty="0"/>
           </a:p>
         </p:txBody>
       </p:sp>
@@ -33531,6 +32669,23 @@
 </file>
 
 <file path=customXml/item1.xml><?xml version="1.0" encoding="utf-8"?>
+<p:properties xmlns:p="http://schemas.microsoft.com/office/2006/metadata/properties" xmlns:xsi="http://www.w3.org/2001/XMLSchema-instance" xmlns:pc="http://schemas.microsoft.com/office/infopath/2007/PartnerControls">
+  <documentManagement>
+    <_activity xmlns="3e5e162a-5953-4fde-83b3-9639e6ab13bb" xsi:nil="true"/>
+  </documentManagement>
+</p:properties>
+</file>
+
+<file path=customXml/item2.xml><?xml version="1.0" encoding="utf-8"?>
+<?mso-contentType ?>
+<FormTemplates xmlns="http://schemas.microsoft.com/sharepoint/v3/contenttype/forms">
+  <Display>DocumentLibraryForm</Display>
+  <Edit>DocumentLibraryForm</Edit>
+  <New>DocumentLibraryForm</New>
+</FormTemplates>
+</file>
+
+<file path=customXml/item3.xml><?xml version="1.0" encoding="utf-8"?>
 <ct:contentTypeSchema xmlns:ct="http://schemas.microsoft.com/office/2006/metadata/contentType" xmlns:ma="http://schemas.microsoft.com/office/2006/metadata/properties/metaAttributes" ct:_="" ma:_="" ma:contentTypeName="Dokument" ma:contentTypeID="0x01010028792A905D4FBE4781303B372FFF56B7" ma:contentTypeVersion="18" ma:contentTypeDescription="Ein neues Dokument erstellen." ma:contentTypeScope="" ma:versionID="1bed101c48ab8d637c0f10f3a19033d6">
   <xsd:schema xmlns:xsd="http://www.w3.org/2001/XMLSchema" xmlns:xs="http://www.w3.org/2001/XMLSchema" xmlns:p="http://schemas.microsoft.com/office/2006/metadata/properties" xmlns:ns3="3e5e162a-5953-4fde-83b3-9639e6ab13bb" xmlns:ns4="266fa233-377d-43d6-82a1-e70154e55ff7" targetNamespace="http://schemas.microsoft.com/office/2006/metadata/properties" ma:root="true" ma:fieldsID="ad54ca06dfd6fdd081bd33575dcf7e57" ns3:_="" ns4:_="">
     <xsd:import namespace="3e5e162a-5953-4fde-83b3-9639e6ab13bb"/>
@@ -33783,24 +32938,32 @@
 </ct:contentTypeSchema>
 </file>
 
-<file path=customXml/item2.xml><?xml version="1.0" encoding="utf-8"?>
-<?mso-contentType ?>
-<FormTemplates xmlns="http://schemas.microsoft.com/sharepoint/v3/contenttype/forms">
-  <Display>DocumentLibraryForm</Display>
-  <Edit>DocumentLibraryForm</Edit>
-  <New>DocumentLibraryForm</New>
-</FormTemplates>
+<file path=customXml/itemProps1.xml><?xml version="1.0" encoding="utf-8"?>
+<ds:datastoreItem xmlns:ds="http://schemas.openxmlformats.org/officeDocument/2006/customXml" ds:itemID="{3D7021EF-4D3D-4708-92FB-F2CD02CEF7A1}">
+  <ds:schemaRefs>
+    <ds:schemaRef ds:uri="http://schemas.openxmlformats.org/package/2006/metadata/core-properties"/>
+    <ds:schemaRef ds:uri="http://schemas.microsoft.com/office/2006/documentManagement/types"/>
+    <ds:schemaRef ds:uri="http://schemas.microsoft.com/office/infopath/2007/PartnerControls"/>
+    <ds:schemaRef ds:uri="http://purl.org/dc/elements/1.1/"/>
+    <ds:schemaRef ds:uri="http://schemas.microsoft.com/office/2006/metadata/properties"/>
+    <ds:schemaRef ds:uri="3e5e162a-5953-4fde-83b3-9639e6ab13bb"/>
+    <ds:schemaRef ds:uri="266fa233-377d-43d6-82a1-e70154e55ff7"/>
+    <ds:schemaRef ds:uri="http://purl.org/dc/terms/"/>
+    <ds:schemaRef ds:uri="http://www.w3.org/XML/1998/namespace"/>
+    <ds:schemaRef ds:uri="http://purl.org/dc/dcmitype/"/>
+  </ds:schemaRefs>
+</ds:datastoreItem>
 </file>
 
-<file path=customXml/item3.xml><?xml version="1.0" encoding="utf-8"?>
-<p:properties xmlns:p="http://schemas.microsoft.com/office/2006/metadata/properties" xmlns:xsi="http://www.w3.org/2001/XMLSchema-instance" xmlns:pc="http://schemas.microsoft.com/office/infopath/2007/PartnerControls">
-  <documentManagement>
-    <_activity xmlns="3e5e162a-5953-4fde-83b3-9639e6ab13bb" xsi:nil="true"/>
-  </documentManagement>
-</p:properties>
+<file path=customXml/itemProps2.xml><?xml version="1.0" encoding="utf-8"?>
+<ds:datastoreItem xmlns:ds="http://schemas.openxmlformats.org/officeDocument/2006/customXml" ds:itemID="{9104BBC9-6B71-4DC1-A0E0-1E198363AC7F}">
+  <ds:schemaRefs>
+    <ds:schemaRef ds:uri="http://schemas.microsoft.com/sharepoint/v3/contenttype/forms"/>
+  </ds:schemaRefs>
+</ds:datastoreItem>
 </file>
 
-<file path=customXml/itemProps1.xml><?xml version="1.0" encoding="utf-8"?>
+<file path=customXml/itemProps3.xml><?xml version="1.0" encoding="utf-8"?>
 <ds:datastoreItem xmlns:ds="http://schemas.openxmlformats.org/officeDocument/2006/customXml" ds:itemID="{F4805544-B524-4E4A-B7C1-6ABFC599928D}">
   <ds:schemaRefs>
     <ds:schemaRef ds:uri="http://schemas.microsoft.com/office/2006/metadata/contentType"/>
@@ -33819,31 +32982,6 @@
 </ds:datastoreItem>
 </file>
 
-<file path=customXml/itemProps2.xml><?xml version="1.0" encoding="utf-8"?>
-<ds:datastoreItem xmlns:ds="http://schemas.openxmlformats.org/officeDocument/2006/customXml" ds:itemID="{9104BBC9-6B71-4DC1-A0E0-1E198363AC7F}">
-  <ds:schemaRefs>
-    <ds:schemaRef ds:uri="http://schemas.microsoft.com/sharepoint/v3/contenttype/forms"/>
-  </ds:schemaRefs>
-</ds:datastoreItem>
-</file>
-
-<file path=customXml/itemProps3.xml><?xml version="1.0" encoding="utf-8"?>
-<ds:datastoreItem xmlns:ds="http://schemas.openxmlformats.org/officeDocument/2006/customXml" ds:itemID="{3D7021EF-4D3D-4708-92FB-F2CD02CEF7A1}">
-  <ds:schemaRefs>
-    <ds:schemaRef ds:uri="http://schemas.openxmlformats.org/package/2006/metadata/core-properties"/>
-    <ds:schemaRef ds:uri="http://schemas.microsoft.com/office/2006/documentManagement/types"/>
-    <ds:schemaRef ds:uri="http://schemas.microsoft.com/office/infopath/2007/PartnerControls"/>
-    <ds:schemaRef ds:uri="http://purl.org/dc/elements/1.1/"/>
-    <ds:schemaRef ds:uri="http://schemas.microsoft.com/office/2006/metadata/properties"/>
-    <ds:schemaRef ds:uri="3e5e162a-5953-4fde-83b3-9639e6ab13bb"/>
-    <ds:schemaRef ds:uri="266fa233-377d-43d6-82a1-e70154e55ff7"/>
-    <ds:schemaRef ds:uri="http://purl.org/dc/terms/"/>
-    <ds:schemaRef ds:uri="http://www.w3.org/XML/1998/namespace"/>
-    <ds:schemaRef ds:uri="http://purl.org/dc/dcmitype/"/>
-  </ds:schemaRefs>
-</ds:datastoreItem>
-</file>
-
 <file path=docMetadata/LabelInfo.xml><?xml version="1.0" encoding="utf-8"?>
 <clbl:labelList xmlns:clbl="http://schemas.microsoft.com/office/2020/mipLabelMetadata">
   <clbl:label id="{2e1fccfb-80ca-4fe1-a574-1516544edb53}" enabled="1" method="Standard" siteId="{364e5b87-c1c7-420d-9bee-c35d19b557a1}" removed="0"/>

</xml_diff>